<commit_message>
Small fix and presentation edit
</commit_message>
<xml_diff>
--- a/Projects-2017-2018/BST-isOrderedByCatalinModan/Prezentare.pptx
+++ b/Projects-2017-2018/BST-isOrderedByCatalinModan/Prezentare.pptx
@@ -309,7 +309,7 @@
           <a:p>
             <a:fld id="{3F33ABEE-51A5-450D-AFB0-FE268E414032}" type="datetimeFigureOut">
               <a:rPr lang="ro-RO" smtClean="0"/>
-              <a:t>11.01.2018</a:t>
+              <a:t>13.01.2018</a:t>
             </a:fld>
             <a:endParaRPr lang="ro-RO" dirty="0"/>
           </a:p>
@@ -576,7 +576,7 @@
           <a:p>
             <a:fld id="{3F33ABEE-51A5-450D-AFB0-FE268E414032}" type="datetimeFigureOut">
               <a:rPr lang="ro-RO" smtClean="0"/>
-              <a:t>11.01.2018</a:t>
+              <a:t>13.01.2018</a:t>
             </a:fld>
             <a:endParaRPr lang="ro-RO" dirty="0"/>
           </a:p>
@@ -807,7 +807,7 @@
           <a:p>
             <a:fld id="{3F33ABEE-51A5-450D-AFB0-FE268E414032}" type="datetimeFigureOut">
               <a:rPr lang="ro-RO" smtClean="0"/>
-              <a:t>11.01.2018</a:t>
+              <a:t>13.01.2018</a:t>
             </a:fld>
             <a:endParaRPr lang="ro-RO" dirty="0"/>
           </a:p>
@@ -1117,7 +1117,7 @@
           <a:p>
             <a:fld id="{3F33ABEE-51A5-450D-AFB0-FE268E414032}" type="datetimeFigureOut">
               <a:rPr lang="ro-RO" smtClean="0"/>
-              <a:t>11.01.2018</a:t>
+              <a:t>13.01.2018</a:t>
             </a:fld>
             <a:endParaRPr lang="ro-RO" dirty="0"/>
           </a:p>
@@ -1590,7 +1590,7 @@
           <a:p>
             <a:fld id="{3F33ABEE-51A5-450D-AFB0-FE268E414032}" type="datetimeFigureOut">
               <a:rPr lang="ro-RO" smtClean="0"/>
-              <a:t>11.01.2018</a:t>
+              <a:t>13.01.2018</a:t>
             </a:fld>
             <a:endParaRPr lang="ro-RO" dirty="0"/>
           </a:p>
@@ -2137,7 +2137,7 @@
           <a:p>
             <a:fld id="{3F33ABEE-51A5-450D-AFB0-FE268E414032}" type="datetimeFigureOut">
               <a:rPr lang="ro-RO" smtClean="0"/>
-              <a:t>11.01.2018</a:t>
+              <a:t>13.01.2018</a:t>
             </a:fld>
             <a:endParaRPr lang="ro-RO" dirty="0"/>
           </a:p>
@@ -2911,7 +2911,7 @@
           <a:p>
             <a:fld id="{3F33ABEE-51A5-450D-AFB0-FE268E414032}" type="datetimeFigureOut">
               <a:rPr lang="ro-RO" smtClean="0"/>
-              <a:t>11.01.2018</a:t>
+              <a:t>13.01.2018</a:t>
             </a:fld>
             <a:endParaRPr lang="ro-RO" dirty="0"/>
           </a:p>
@@ -3086,7 +3086,7 @@
           <a:p>
             <a:fld id="{3F33ABEE-51A5-450D-AFB0-FE268E414032}" type="datetimeFigureOut">
               <a:rPr lang="ro-RO" smtClean="0"/>
-              <a:t>11.01.2018</a:t>
+              <a:t>13.01.2018</a:t>
             </a:fld>
             <a:endParaRPr lang="ro-RO" dirty="0"/>
           </a:p>
@@ -3309,7 +3309,7 @@
           <a:p>
             <a:fld id="{3F33ABEE-51A5-450D-AFB0-FE268E414032}" type="datetimeFigureOut">
               <a:rPr lang="ro-RO" smtClean="0"/>
-              <a:t>11.01.2018</a:t>
+              <a:t>13.01.2018</a:t>
             </a:fld>
             <a:endParaRPr lang="ro-RO" dirty="0"/>
           </a:p>
@@ -3489,7 +3489,7 @@
           <a:p>
             <a:fld id="{3F33ABEE-51A5-450D-AFB0-FE268E414032}" type="datetimeFigureOut">
               <a:rPr lang="ro-RO" smtClean="0"/>
-              <a:t>11.01.2018</a:t>
+              <a:t>13.01.2018</a:t>
             </a:fld>
             <a:endParaRPr lang="ro-RO" dirty="0"/>
           </a:p>
@@ -3778,7 +3778,7 @@
           <a:p>
             <a:fld id="{3F33ABEE-51A5-450D-AFB0-FE268E414032}" type="datetimeFigureOut">
               <a:rPr lang="ro-RO" smtClean="0"/>
-              <a:t>11.01.2018</a:t>
+              <a:t>13.01.2018</a:t>
             </a:fld>
             <a:endParaRPr lang="ro-RO" dirty="0"/>
           </a:p>
@@ -4020,7 +4020,7 @@
           <a:p>
             <a:fld id="{3F33ABEE-51A5-450D-AFB0-FE268E414032}" type="datetimeFigureOut">
               <a:rPr lang="ro-RO" smtClean="0"/>
-              <a:t>11.01.2018</a:t>
+              <a:t>13.01.2018</a:t>
             </a:fld>
             <a:endParaRPr lang="ro-RO" dirty="0"/>
           </a:p>
@@ -4399,7 +4399,7 @@
           <a:p>
             <a:fld id="{3F33ABEE-51A5-450D-AFB0-FE268E414032}" type="datetimeFigureOut">
               <a:rPr lang="ro-RO" smtClean="0"/>
-              <a:t>11.01.2018</a:t>
+              <a:t>13.01.2018</a:t>
             </a:fld>
             <a:endParaRPr lang="ro-RO" dirty="0"/>
           </a:p>
@@ -4517,7 +4517,7 @@
           <a:p>
             <a:fld id="{3F33ABEE-51A5-450D-AFB0-FE268E414032}" type="datetimeFigureOut">
               <a:rPr lang="ro-RO" smtClean="0"/>
-              <a:t>11.01.2018</a:t>
+              <a:t>13.01.2018</a:t>
             </a:fld>
             <a:endParaRPr lang="ro-RO" dirty="0"/>
           </a:p>
@@ -4612,7 +4612,7 @@
           <a:p>
             <a:fld id="{3F33ABEE-51A5-450D-AFB0-FE268E414032}" type="datetimeFigureOut">
               <a:rPr lang="ro-RO" smtClean="0"/>
-              <a:t>11.01.2018</a:t>
+              <a:t>13.01.2018</a:t>
             </a:fld>
             <a:endParaRPr lang="ro-RO" dirty="0"/>
           </a:p>
@@ -4861,7 +4861,7 @@
           <a:p>
             <a:fld id="{3F33ABEE-51A5-450D-AFB0-FE268E414032}" type="datetimeFigureOut">
               <a:rPr lang="ro-RO" smtClean="0"/>
-              <a:t>11.01.2018</a:t>
+              <a:t>13.01.2018</a:t>
             </a:fld>
             <a:endParaRPr lang="ro-RO" dirty="0"/>
           </a:p>
@@ -5118,7 +5118,7 @@
           <a:p>
             <a:fld id="{3F33ABEE-51A5-450D-AFB0-FE268E414032}" type="datetimeFigureOut">
               <a:rPr lang="ro-RO" smtClean="0"/>
-              <a:t>11.01.2018</a:t>
+              <a:t>13.01.2018</a:t>
             </a:fld>
             <a:endParaRPr lang="ro-RO" dirty="0"/>
           </a:p>
@@ -5361,7 +5361,7 @@
           <a:p>
             <a:fld id="{3F33ABEE-51A5-450D-AFB0-FE268E414032}" type="datetimeFigureOut">
               <a:rPr lang="ro-RO" smtClean="0"/>
-              <a:t>11.01.2018</a:t>
+              <a:t>13.01.2018</a:t>
             </a:fld>
             <a:endParaRPr lang="ro-RO" dirty="0"/>
           </a:p>
@@ -8763,14 +8763,98 @@
                 <a:latin typeface="Times New Roman" panose="02020603050405020304" pitchFamily="18" charset="0"/>
                 <a:cs typeface="Times New Roman" panose="02020603050405020304" pitchFamily="18" charset="0"/>
               </a:rPr>
-              <a:t>Steps</a:t>
+              <a:t>Check</a:t>
             </a:r>
             <a:r>
               <a:rPr lang="ro-RO" sz="2000" dirty="0">
                 <a:latin typeface="Times New Roman" panose="02020603050405020304" pitchFamily="18" charset="0"/>
                 <a:cs typeface="Times New Roman" panose="02020603050405020304" pitchFamily="18" charset="0"/>
               </a:rPr>
-              <a:t>:</a:t>
+              <a:t> </a:t>
+            </a:r>
+            <a:r>
+              <a:rPr lang="ro-RO" sz="2000" dirty="0" err="1">
+                <a:latin typeface="Times New Roman" panose="02020603050405020304" pitchFamily="18" charset="0"/>
+                <a:cs typeface="Times New Roman" panose="02020603050405020304" pitchFamily="18" charset="0"/>
+              </a:rPr>
+              <a:t>if</a:t>
+            </a:r>
+            <a:r>
+              <a:rPr lang="ro-RO" sz="2000" dirty="0">
+                <a:latin typeface="Times New Roman" panose="02020603050405020304" pitchFamily="18" charset="0"/>
+                <a:cs typeface="Times New Roman" panose="02020603050405020304" pitchFamily="18" charset="0"/>
+              </a:rPr>
+              <a:t> </a:t>
+            </a:r>
+            <a:r>
+              <a:rPr lang="ro-RO" sz="2000" dirty="0" err="1">
+                <a:latin typeface="Times New Roman" panose="02020603050405020304" pitchFamily="18" charset="0"/>
+                <a:cs typeface="Times New Roman" panose="02020603050405020304" pitchFamily="18" charset="0"/>
+              </a:rPr>
+              <a:t>the</a:t>
+            </a:r>
+            <a:r>
+              <a:rPr lang="ro-RO" sz="2000" dirty="0">
+                <a:latin typeface="Times New Roman" panose="02020603050405020304" pitchFamily="18" charset="0"/>
+                <a:cs typeface="Times New Roman" panose="02020603050405020304" pitchFamily="18" charset="0"/>
+              </a:rPr>
+              <a:t> </a:t>
+            </a:r>
+            <a:r>
+              <a:rPr lang="ro-RO" sz="2000" dirty="0" err="1">
+                <a:latin typeface="Times New Roman" panose="02020603050405020304" pitchFamily="18" charset="0"/>
+                <a:cs typeface="Times New Roman" panose="02020603050405020304" pitchFamily="18" charset="0"/>
+              </a:rPr>
+              <a:t>current</a:t>
+            </a:r>
+            <a:r>
+              <a:rPr lang="ro-RO" sz="2000" dirty="0">
+                <a:latin typeface="Times New Roman" panose="02020603050405020304" pitchFamily="18" charset="0"/>
+                <a:cs typeface="Times New Roman" panose="02020603050405020304" pitchFamily="18" charset="0"/>
+              </a:rPr>
+              <a:t> </a:t>
+            </a:r>
+            <a:r>
+              <a:rPr lang="ro-RO" sz="2000" dirty="0" err="1">
+                <a:latin typeface="Times New Roman" panose="02020603050405020304" pitchFamily="18" charset="0"/>
+                <a:cs typeface="Times New Roman" panose="02020603050405020304" pitchFamily="18" charset="0"/>
+              </a:rPr>
+              <a:t>node</a:t>
+            </a:r>
+            <a:r>
+              <a:rPr lang="ro-RO" sz="2000" dirty="0">
+                <a:latin typeface="Times New Roman" panose="02020603050405020304" pitchFamily="18" charset="0"/>
+                <a:cs typeface="Times New Roman" panose="02020603050405020304" pitchFamily="18" charset="0"/>
+              </a:rPr>
+              <a:t> </a:t>
+            </a:r>
+            <a:r>
+              <a:rPr lang="ro-RO" sz="2000" dirty="0" err="1">
+                <a:latin typeface="Times New Roman" panose="02020603050405020304" pitchFamily="18" charset="0"/>
+                <a:cs typeface="Times New Roman" panose="02020603050405020304" pitchFamily="18" charset="0"/>
+              </a:rPr>
+              <a:t>is</a:t>
+            </a:r>
+            <a:r>
+              <a:rPr lang="ro-RO" sz="2000" dirty="0">
+                <a:latin typeface="Times New Roman" panose="02020603050405020304" pitchFamily="18" charset="0"/>
+                <a:cs typeface="Times New Roman" panose="02020603050405020304" pitchFamily="18" charset="0"/>
+              </a:rPr>
+              <a:t> </a:t>
+            </a:r>
+            <a:r>
+              <a:rPr lang="ro-RO" sz="2000" dirty="0" err="1">
+                <a:latin typeface="Times New Roman" panose="02020603050405020304" pitchFamily="18" charset="0"/>
+                <a:cs typeface="Times New Roman" panose="02020603050405020304" pitchFamily="18" charset="0"/>
+              </a:rPr>
+              <a:t>not</a:t>
+            </a:r>
+            <a:r>
+              <a:rPr lang="ro-RO" sz="2000" dirty="0">
+                <a:latin typeface="Times New Roman" panose="02020603050405020304" pitchFamily="18" charset="0"/>
+                <a:cs typeface="Times New Roman" panose="02020603050405020304" pitchFamily="18" charset="0"/>
+              </a:rPr>
+              <a:t> NULL:</a:t>
             </a:r>
           </a:p>
           <a:p>
@@ -9616,11 +9700,25 @@
               <a:t>, </a:t>
             </a:r>
             <a:r>
+              <a:rPr lang="ro-RO" sz="2000" b="1" dirty="0" err="1">
+                <a:latin typeface="Times New Roman" panose="02020603050405020304" pitchFamily="18" charset="0"/>
+                <a:cs typeface="Times New Roman" panose="02020603050405020304" pitchFamily="18" charset="0"/>
+              </a:rPr>
+              <a:t>if</a:t>
+            </a:r>
+            <a:r>
+              <a:rPr lang="ro-RO" sz="2000" dirty="0">
+                <a:latin typeface="Times New Roman" panose="02020603050405020304" pitchFamily="18" charset="0"/>
+                <a:cs typeface="Times New Roman" panose="02020603050405020304" pitchFamily="18" charset="0"/>
+              </a:rPr>
+              <a:t> it </a:t>
+            </a:r>
+            <a:r>
               <a:rPr lang="ro-RO" sz="2000" dirty="0" err="1">
                 <a:latin typeface="Times New Roman" panose="02020603050405020304" pitchFamily="18" charset="0"/>
                 <a:cs typeface="Times New Roman" panose="02020603050405020304" pitchFamily="18" charset="0"/>
               </a:rPr>
-              <a:t>we</a:t>
+              <a:t>has</a:t>
             </a:r>
             <a:r>
               <a:rPr lang="ro-RO" sz="2000" dirty="0">
@@ -9634,7 +9732,7 @@
                 <a:latin typeface="Times New Roman" panose="02020603050405020304" pitchFamily="18" charset="0"/>
                 <a:cs typeface="Times New Roman" panose="02020603050405020304" pitchFamily="18" charset="0"/>
               </a:rPr>
-              <a:t>have</a:t>
+              <a:t>no</a:t>
             </a:r>
             <a:r>
               <a:rPr lang="ro-RO" sz="2000" dirty="0">
@@ -9648,7 +9746,7 @@
                 <a:latin typeface="Times New Roman" panose="02020603050405020304" pitchFamily="18" charset="0"/>
                 <a:cs typeface="Times New Roman" panose="02020603050405020304" pitchFamily="18" charset="0"/>
               </a:rPr>
-              <a:t>checked</a:t>
+              <a:t>children</a:t>
             </a:r>
             <a:r>
               <a:rPr lang="ro-RO" sz="2000" dirty="0">
@@ -9662,49 +9760,49 @@
                 <a:latin typeface="Times New Roman" panose="02020603050405020304" pitchFamily="18" charset="0"/>
                 <a:cs typeface="Times New Roman" panose="02020603050405020304" pitchFamily="18" charset="0"/>
               </a:rPr>
-              <a:t>all</a:t>
+              <a:t>it’s</a:t>
             </a:r>
             <a:r>
               <a:rPr lang="ro-RO" sz="2000" dirty="0">
                 <a:latin typeface="Times New Roman" panose="02020603050405020304" pitchFamily="18" charset="0"/>
                 <a:cs typeface="Times New Roman" panose="02020603050405020304" pitchFamily="18" charset="0"/>
               </a:rPr>
-              <a:t> </a:t>
+              <a:t> a </a:t>
             </a:r>
             <a:r>
               <a:rPr lang="ro-RO" sz="2000" dirty="0" err="1">
                 <a:latin typeface="Times New Roman" panose="02020603050405020304" pitchFamily="18" charset="0"/>
                 <a:cs typeface="Times New Roman" panose="02020603050405020304" pitchFamily="18" charset="0"/>
               </a:rPr>
-              <a:t>the</a:t>
+              <a:t>leaf</a:t>
             </a:r>
             <a:r>
               <a:rPr lang="ro-RO" sz="2000" dirty="0">
                 <a:latin typeface="Times New Roman" panose="02020603050405020304" pitchFamily="18" charset="0"/>
                 <a:cs typeface="Times New Roman" panose="02020603050405020304" pitchFamily="18" charset="0"/>
               </a:rPr>
-              <a:t> </a:t>
+              <a:t>, </a:t>
             </a:r>
             <a:r>
               <a:rPr lang="ro-RO" sz="2000" dirty="0" err="1">
                 <a:latin typeface="Times New Roman" panose="02020603050405020304" pitchFamily="18" charset="0"/>
                 <a:cs typeface="Times New Roman" panose="02020603050405020304" pitchFamily="18" charset="0"/>
               </a:rPr>
-              <a:t>nodes</a:t>
+              <a:t>return</a:t>
             </a:r>
             <a:r>
               <a:rPr lang="ro-RO" sz="2000" dirty="0">
                 <a:latin typeface="Times New Roman" panose="02020603050405020304" pitchFamily="18" charset="0"/>
                 <a:cs typeface="Times New Roman" panose="02020603050405020304" pitchFamily="18" charset="0"/>
               </a:rPr>
-              <a:t>, </a:t>
+              <a:t> </a:t>
             </a:r>
             <a:r>
               <a:rPr lang="ro-RO" sz="2000" dirty="0" err="1">
                 <a:latin typeface="Times New Roman" panose="02020603050405020304" pitchFamily="18" charset="0"/>
                 <a:cs typeface="Times New Roman" panose="02020603050405020304" pitchFamily="18" charset="0"/>
               </a:rPr>
-              <a:t>return</a:t>
+              <a:t>true</a:t>
             </a:r>
             <a:r>
               <a:rPr lang="ro-RO" sz="2000" dirty="0">
@@ -9714,35 +9812,75 @@
               <a:t> </a:t>
             </a:r>
             <a:r>
-              <a:rPr lang="ro-RO" sz="2000" b="1" dirty="0" err="1">
-                <a:solidFill>
-                  <a:schemeClr val="accent5">
-                    <a:lumMod val="60000"/>
-                    <a:lumOff val="40000"/>
-                  </a:schemeClr>
-                </a:solidFill>
-                <a:latin typeface="Times New Roman" panose="02020603050405020304" pitchFamily="18" charset="0"/>
-                <a:cs typeface="Times New Roman" panose="02020603050405020304" pitchFamily="18" charset="0"/>
-              </a:rPr>
-              <a:t>true</a:t>
-            </a:r>
-            <a:endParaRPr lang="ro-RO" sz="2000" b="1" dirty="0">
-              <a:solidFill>
-                <a:schemeClr val="accent5">
-                  <a:lumMod val="60000"/>
-                  <a:lumOff val="40000"/>
-                </a:schemeClr>
-              </a:solidFill>
-              <a:latin typeface="Times New Roman" panose="02020603050405020304" pitchFamily="18" charset="0"/>
-              <a:cs typeface="Times New Roman" panose="02020603050405020304" pitchFamily="18" charset="0"/>
-            </a:endParaRPr>
-          </a:p>
-          <a:p>
-            <a:pPr lvl="3"/>
+              <a:rPr lang="ro-RO" sz="2000" dirty="0" err="1">
+                <a:latin typeface="Times New Roman" panose="02020603050405020304" pitchFamily="18" charset="0"/>
+                <a:cs typeface="Times New Roman" panose="02020603050405020304" pitchFamily="18" charset="0"/>
+              </a:rPr>
+              <a:t>if</a:t>
+            </a:r>
+            <a:r>
+              <a:rPr lang="ro-RO" sz="2000" dirty="0">
+                <a:latin typeface="Times New Roman" panose="02020603050405020304" pitchFamily="18" charset="0"/>
+                <a:cs typeface="Times New Roman" panose="02020603050405020304" pitchFamily="18" charset="0"/>
+              </a:rPr>
+              <a:t> it </a:t>
+            </a:r>
+            <a:r>
+              <a:rPr lang="ro-RO" sz="2000" dirty="0" err="1">
+                <a:latin typeface="Times New Roman" panose="02020603050405020304" pitchFamily="18" charset="0"/>
+                <a:cs typeface="Times New Roman" panose="02020603050405020304" pitchFamily="18" charset="0"/>
+              </a:rPr>
+              <a:t>is</a:t>
+            </a:r>
+            <a:r>
+              <a:rPr lang="ro-RO" sz="2000" dirty="0">
+                <a:latin typeface="Times New Roman" panose="02020603050405020304" pitchFamily="18" charset="0"/>
+                <a:cs typeface="Times New Roman" panose="02020603050405020304" pitchFamily="18" charset="0"/>
+              </a:rPr>
+              <a:t> </a:t>
+            </a:r>
+            <a:r>
+              <a:rPr lang="ro-RO" sz="2000" dirty="0" err="1">
+                <a:latin typeface="Times New Roman" panose="02020603050405020304" pitchFamily="18" charset="0"/>
+                <a:cs typeface="Times New Roman" panose="02020603050405020304" pitchFamily="18" charset="0"/>
+              </a:rPr>
+              <a:t>bounded</a:t>
+            </a:r>
             <a:endParaRPr lang="ro-RO" sz="2000" dirty="0">
               <a:latin typeface="Times New Roman" panose="02020603050405020304" pitchFamily="18" charset="0"/>
               <a:cs typeface="Times New Roman" panose="02020603050405020304" pitchFamily="18" charset="0"/>
             </a:endParaRPr>
+          </a:p>
+          <a:p>
+            <a:pPr lvl="3"/>
+            <a:r>
+              <a:rPr lang="ro-RO" sz="2000" b="1" u="sng" dirty="0" err="1">
+                <a:latin typeface="Times New Roman" panose="02020603050405020304" pitchFamily="18" charset="0"/>
+                <a:cs typeface="Times New Roman" panose="02020603050405020304" pitchFamily="18" charset="0"/>
+              </a:rPr>
+              <a:t>Else</a:t>
+            </a:r>
+            <a:r>
+              <a:rPr lang="ro-RO" sz="2000" dirty="0">
+                <a:latin typeface="Times New Roman" panose="02020603050405020304" pitchFamily="18" charset="0"/>
+                <a:cs typeface="Times New Roman" panose="02020603050405020304" pitchFamily="18" charset="0"/>
+              </a:rPr>
+              <a:t> </a:t>
+            </a:r>
+            <a:r>
+              <a:rPr lang="ro-RO" sz="2000" dirty="0" err="1">
+                <a:latin typeface="Times New Roman" panose="02020603050405020304" pitchFamily="18" charset="0"/>
+                <a:cs typeface="Times New Roman" panose="02020603050405020304" pitchFamily="18" charset="0"/>
+              </a:rPr>
+              <a:t>return</a:t>
+            </a:r>
+            <a:r>
+              <a:rPr lang="ro-RO" sz="2000" dirty="0">
+                <a:latin typeface="Times New Roman" panose="02020603050405020304" pitchFamily="18" charset="0"/>
+                <a:cs typeface="Times New Roman" panose="02020603050405020304" pitchFamily="18" charset="0"/>
+              </a:rPr>
+              <a:t> false</a:t>
+            </a:r>
           </a:p>
           <a:p>
             <a:pPr lvl="1"/>

</xml_diff>